<commit_message>
APP_FRONT Ajout du lien vers le site
Dans les paramètres
</commit_message>
<xml_diff>
--- a/.documents/Présentation - mercredi 22 mai/Soutenance du projet.pptx
+++ b/.documents/Présentation - mercredi 22 mai/Soutenance du projet.pptx
@@ -5,21 +5,20 @@
     <p:sldMasterId id="2147483660" r:id="rId1"/>
   </p:sldMasterIdLst>
   <p:notesMasterIdLst>
-    <p:notesMasterId r:id="rId14"/>
+    <p:notesMasterId r:id="rId13"/>
   </p:notesMasterIdLst>
   <p:sldIdLst>
     <p:sldId id="257" r:id="rId2"/>
     <p:sldId id="263" r:id="rId3"/>
     <p:sldId id="259" r:id="rId4"/>
     <p:sldId id="261" r:id="rId5"/>
-    <p:sldId id="260" r:id="rId6"/>
-    <p:sldId id="262" r:id="rId7"/>
-    <p:sldId id="264" r:id="rId8"/>
-    <p:sldId id="265" r:id="rId9"/>
-    <p:sldId id="266" r:id="rId10"/>
-    <p:sldId id="267" r:id="rId11"/>
-    <p:sldId id="268" r:id="rId12"/>
-    <p:sldId id="269" r:id="rId13"/>
+    <p:sldId id="262" r:id="rId6"/>
+    <p:sldId id="264" r:id="rId7"/>
+    <p:sldId id="265" r:id="rId8"/>
+    <p:sldId id="266" r:id="rId9"/>
+    <p:sldId id="267" r:id="rId10"/>
+    <p:sldId id="268" r:id="rId11"/>
+    <p:sldId id="269" r:id="rId12"/>
   </p:sldIdLst>
   <p:sldSz cx="12192000" cy="6858000"/>
   <p:notesSz cx="6858000" cy="9144000"/>
@@ -208,7 +207,7 @@
           <a:p>
             <a:fld id="{4BE426E3-4ECB-43E4-897A-1DD0B5BA0065}" type="datetimeFigureOut">
               <a:rPr lang="fr-FR" smtClean="0"/>
-              <a:t>19/05/2024</a:t>
+              <a:t>21/05/2024</a:t>
             </a:fld>
             <a:endParaRPr lang="fr-FR"/>
           </a:p>
@@ -523,225 +522,7 @@
               <a:buFontTx/>
               <a:buChar char="-"/>
             </a:pPr>
-            <a:r>
-              <a:rPr lang="fr-FR" dirty="0"/>
-              <a:t>Introduction</a:t>
-            </a:r>
-          </a:p>
-          <a:p>
-            <a:pPr marL="628650" lvl="1" indent="-171450">
-              <a:buFontTx/>
-              <a:buChar char="-"/>
-            </a:pPr>
-            <a:r>
-              <a:rPr lang="fr-FR" dirty="0"/>
-              <a:t>Expliquer le projet de façon non-technique</a:t>
-            </a:r>
-          </a:p>
-          <a:p>
-            <a:pPr marL="1085850" lvl="2" indent="-171450">
-              <a:buFontTx/>
-              <a:buChar char="-"/>
-            </a:pPr>
-            <a:r>
-              <a:rPr lang="fr-FR" dirty="0"/>
-              <a:t>Concept / Fonctionnalités</a:t>
-            </a:r>
-          </a:p>
-          <a:p>
-            <a:pPr marL="1085850" lvl="2" indent="-171450">
-              <a:buFontTx/>
-              <a:buChar char="-"/>
-            </a:pPr>
-            <a:r>
-              <a:rPr lang="fr-FR" dirty="0"/>
-              <a:t>Ambitions</a:t>
-            </a:r>
-          </a:p>
-          <a:p>
-            <a:pPr marL="914400" lvl="2" indent="0">
-              <a:buFontTx/>
-              <a:buNone/>
-            </a:pPr>
             <a:endParaRPr lang="fr-FR" dirty="0"/>
-          </a:p>
-          <a:p>
-            <a:pPr marL="171450" indent="-171450">
-              <a:buFontTx/>
-              <a:buChar char="-"/>
-            </a:pPr>
-            <a:r>
-              <a:rPr lang="fr-FR" dirty="0"/>
-              <a:t>Vie du projet</a:t>
-            </a:r>
-          </a:p>
-          <a:p>
-            <a:pPr marL="628650" lvl="1" indent="-171450">
-              <a:buFontTx/>
-              <a:buChar char="-"/>
-            </a:pPr>
-            <a:r>
-              <a:rPr lang="fr-FR" dirty="0"/>
-              <a:t>Organisation interne</a:t>
-            </a:r>
-          </a:p>
-          <a:p>
-            <a:pPr marL="628650" lvl="1" indent="-171450">
-              <a:buFontTx/>
-              <a:buChar char="-"/>
-            </a:pPr>
-            <a:r>
-              <a:rPr lang="fr-FR" dirty="0"/>
-              <a:t>Architecture technique de la solution (</a:t>
-            </a:r>
-            <a:r>
-              <a:rPr lang="fr-FR" b="1" dirty="0"/>
-              <a:t>ne pas montrer de lignes de code</a:t>
-            </a:r>
-            <a:r>
-              <a:rPr lang="fr-FR" dirty="0"/>
-              <a:t>)</a:t>
-            </a:r>
-          </a:p>
-          <a:p>
-            <a:pPr marL="628650" lvl="1" indent="-171450">
-              <a:buFontTx/>
-              <a:buChar char="-"/>
-            </a:pPr>
-            <a:r>
-              <a:rPr lang="fr-FR" dirty="0"/>
-              <a:t>Présenter l’expérience</a:t>
-            </a:r>
-          </a:p>
-          <a:p>
-            <a:pPr marL="628650" lvl="1" indent="-171450">
-              <a:buFontTx/>
-              <a:buChar char="-"/>
-            </a:pPr>
-            <a:endParaRPr lang="fr-FR" dirty="0"/>
-          </a:p>
-          <a:p>
-            <a:pPr marL="171450" indent="-171450">
-              <a:buFontTx/>
-              <a:buChar char="-"/>
-            </a:pPr>
-            <a:r>
-              <a:rPr lang="fr-FR" dirty="0"/>
-              <a:t>Conclusion</a:t>
-            </a:r>
-          </a:p>
-          <a:p>
-            <a:pPr marL="628650" lvl="1" indent="-171450">
-              <a:buFontTx/>
-              <a:buChar char="-"/>
-            </a:pPr>
-            <a:r>
-              <a:rPr lang="fr-FR" dirty="0"/>
-              <a:t>Bilan individuel </a:t>
-            </a:r>
-            <a:r>
-              <a:rPr lang="fr-FR" b="1" dirty="0"/>
-              <a:t>de chacun</a:t>
-            </a:r>
-            <a:endParaRPr lang="fr-FR" b="0" dirty="0"/>
-          </a:p>
-          <a:p>
-            <a:pPr marL="628650" lvl="1" indent="-171450">
-              <a:buFontTx/>
-              <a:buChar char="-"/>
-            </a:pPr>
-            <a:endParaRPr lang="fr-FR" dirty="0"/>
-          </a:p>
-          <a:p>
-            <a:pPr marL="171450" indent="-171450">
-              <a:buFontTx/>
-              <a:buChar char="-"/>
-            </a:pPr>
-            <a:endParaRPr lang="fr-FR" dirty="0"/>
-          </a:p>
-          <a:p>
-            <a:pPr marL="171450" indent="-171450">
-              <a:buFontTx/>
-              <a:buChar char="-"/>
-            </a:pPr>
-            <a:r>
-              <a:rPr lang="fr-FR" dirty="0"/>
-              <a:t>/!\ Besoin </a:t>
-            </a:r>
-            <a:r>
-              <a:rPr lang="fr-FR" b="1" dirty="0"/>
-              <a:t>DONC</a:t>
-            </a:r>
-            <a:r>
-              <a:rPr lang="fr-FR" dirty="0"/>
-              <a:t> choix  -  Toujours présenter les choses de la sorte. </a:t>
-            </a:r>
-          </a:p>
-          <a:p>
-            <a:pPr marL="171450" marR="0" lvl="0" indent="-171450" algn="l" defTabSz="914400" rtl="0" eaLnBrk="1" fontAlgn="auto" latinLnBrk="0" hangingPunct="1">
-              <a:lnSpc>
-                <a:spcPct val="100000"/>
-              </a:lnSpc>
-              <a:spcBef>
-                <a:spcPts val="0"/>
-              </a:spcBef>
-              <a:spcAft>
-                <a:spcPts val="0"/>
-              </a:spcAft>
-              <a:buClrTx/>
-              <a:buSzTx/>
-              <a:buFontTx/>
-              <a:buChar char="-"/>
-              <a:tabLst/>
-              <a:defRPr/>
-            </a:pPr>
-            <a:r>
-              <a:rPr lang="fr-FR" dirty="0"/>
-              <a:t>20 minutes, on est 8</a:t>
-            </a:r>
-          </a:p>
-          <a:p>
-            <a:pPr marL="171450" marR="0" lvl="0" indent="-171450" algn="l" defTabSz="914400" rtl="0" eaLnBrk="1" fontAlgn="auto" latinLnBrk="0" hangingPunct="1">
-              <a:lnSpc>
-                <a:spcPct val="100000"/>
-              </a:lnSpc>
-              <a:spcBef>
-                <a:spcPts val="0"/>
-              </a:spcBef>
-              <a:spcAft>
-                <a:spcPts val="0"/>
-              </a:spcAft>
-              <a:buClrTx/>
-              <a:buSzTx/>
-              <a:buFontTx/>
-              <a:buChar char="-"/>
-              <a:tabLst/>
-              <a:defRPr/>
-            </a:pPr>
-            <a:endParaRPr lang="fr-FR" dirty="0"/>
-          </a:p>
-          <a:p>
-            <a:pPr marL="171450" marR="0" lvl="0" indent="-171450" algn="l" defTabSz="914400" rtl="0" eaLnBrk="1" fontAlgn="auto" latinLnBrk="0" hangingPunct="1">
-              <a:lnSpc>
-                <a:spcPct val="100000"/>
-              </a:lnSpc>
-              <a:spcBef>
-                <a:spcPts val="0"/>
-              </a:spcBef>
-              <a:spcAft>
-                <a:spcPts val="0"/>
-              </a:spcAft>
-              <a:buClrTx/>
-              <a:buSzTx/>
-              <a:buFontTx/>
-              <a:buChar char="-"/>
-              <a:tabLst/>
-              <a:defRPr/>
-            </a:pPr>
-            <a:r>
-              <a:rPr lang="fr-FR" dirty="0"/>
-              <a:t>Pas de « à ce jour »</a:t>
-            </a:r>
           </a:p>
         </p:txBody>
       </p:sp>
@@ -855,7 +636,7 @@
     </p:spTree>
     <p:extLst>
       <p:ext uri="{BB962C8B-B14F-4D97-AF65-F5344CB8AC3E}">
-        <p14:creationId xmlns:p14="http://schemas.microsoft.com/office/powerpoint/2010/main" val="196790571"/>
+        <p14:creationId xmlns:p14="http://schemas.microsoft.com/office/powerpoint/2010/main" val="4268579973"/>
       </p:ext>
     </p:extLst>
   </p:cSld>
@@ -931,90 +712,6 @@
             <a:fld id="{6FCD5C08-D862-4437-A41E-6C335EA9187E}" type="slidenum">
               <a:rPr lang="fr-FR" smtClean="0"/>
               <a:t>11</a:t>
-            </a:fld>
-            <a:endParaRPr lang="fr-FR"/>
-          </a:p>
-        </p:txBody>
-      </p:sp>
-    </p:spTree>
-    <p:extLst>
-      <p:ext uri="{BB962C8B-B14F-4D97-AF65-F5344CB8AC3E}">
-        <p14:creationId xmlns:p14="http://schemas.microsoft.com/office/powerpoint/2010/main" val="4268579973"/>
-      </p:ext>
-    </p:extLst>
-  </p:cSld>
-  <p:clrMapOvr>
-    <a:masterClrMapping/>
-  </p:clrMapOvr>
-</p:notes>
-</file>
-
-<file path=ppt/notesSlides/notesSlide12.xml><?xml version="1.0" encoding="utf-8"?>
-<p:notes xmlns:a="http://schemas.openxmlformats.org/drawingml/2006/main" xmlns:r="http://schemas.openxmlformats.org/officeDocument/2006/relationships" xmlns:p="http://schemas.openxmlformats.org/presentationml/2006/main">
-  <p:cSld>
-    <p:spTree>
-      <p:nvGrpSpPr>
-        <p:cNvPr id="1" name=""/>
-        <p:cNvGrpSpPr/>
-        <p:nvPr/>
-      </p:nvGrpSpPr>
-      <p:grpSpPr>
-        <a:xfrm>
-          <a:off x="0" y="0"/>
-          <a:ext cx="0" cy="0"/>
-          <a:chOff x="0" y="0"/>
-          <a:chExt cx="0" cy="0"/>
-        </a:xfrm>
-      </p:grpSpPr>
-      <p:sp>
-        <p:nvSpPr>
-          <p:cNvPr id="2" name="Espace réservé de l'image des diapositives 1"/>
-          <p:cNvSpPr>
-            <a:spLocks noGrp="1" noRot="1" noChangeAspect="1"/>
-          </p:cNvSpPr>
-          <p:nvPr>
-            <p:ph type="sldImg"/>
-          </p:nvPr>
-        </p:nvSpPr>
-        <p:spPr/>
-      </p:sp>
-      <p:sp>
-        <p:nvSpPr>
-          <p:cNvPr id="3" name="Espace réservé des notes 2"/>
-          <p:cNvSpPr>
-            <a:spLocks noGrp="1"/>
-          </p:cNvSpPr>
-          <p:nvPr>
-            <p:ph type="body" idx="1"/>
-          </p:nvPr>
-        </p:nvSpPr>
-        <p:spPr/>
-        <p:txBody>
-          <a:bodyPr/>
-          <a:lstStyle/>
-          <a:p>
-            <a:endParaRPr lang="fr-FR" dirty="0"/>
-          </a:p>
-        </p:txBody>
-      </p:sp>
-      <p:sp>
-        <p:nvSpPr>
-          <p:cNvPr id="4" name="Espace réservé du numéro de diapositive 3"/>
-          <p:cNvSpPr>
-            <a:spLocks noGrp="1"/>
-          </p:cNvSpPr>
-          <p:nvPr>
-            <p:ph type="sldNum" sz="quarter" idx="5"/>
-          </p:nvPr>
-        </p:nvSpPr>
-        <p:spPr/>
-        <p:txBody>
-          <a:bodyPr/>
-          <a:lstStyle/>
-          <a:p>
-            <a:fld id="{6FCD5C08-D862-4437-A41E-6C335EA9187E}" type="slidenum">
-              <a:rPr lang="fr-FR" smtClean="0"/>
-              <a:t>12</a:t>
             </a:fld>
             <a:endParaRPr lang="fr-FR"/>
           </a:p>
@@ -1338,26 +1035,51 @@
           <a:bodyPr/>
           <a:lstStyle/>
           <a:p>
-            <a:pPr marL="0" marR="0" lvl="0" indent="0" algn="l" defTabSz="914400" rtl="0" eaLnBrk="1" fontAlgn="auto" latinLnBrk="0" hangingPunct="1">
-              <a:lnSpc>
-                <a:spcPct val="100000"/>
-              </a:lnSpc>
-              <a:spcBef>
-                <a:spcPts val="0"/>
-              </a:spcBef>
-              <a:spcAft>
-                <a:spcPts val="0"/>
-              </a:spcAft>
-              <a:buClrTx/>
-              <a:buSzTx/>
+            <a:pPr marL="171450" indent="-171450">
               <a:buFontTx/>
-              <a:buNone/>
-              <a:tabLst/>
-              <a:defRPr/>
+              <a:buChar char="-"/>
             </a:pPr>
             <a:r>
               <a:rPr lang="fr-FR" dirty="0"/>
-              <a:t>1. Introduction</a:t>
+              <a:t>Vie du projet</a:t>
+            </a:r>
+          </a:p>
+          <a:p>
+            <a:pPr marL="628650" lvl="1" indent="-171450">
+              <a:buFontTx/>
+              <a:buChar char="-"/>
+            </a:pPr>
+            <a:r>
+              <a:rPr lang="fr-FR" dirty="0"/>
+              <a:t>Organisation interne</a:t>
+            </a:r>
+          </a:p>
+          <a:p>
+            <a:pPr marL="628650" lvl="1" indent="-171450">
+              <a:buFontTx/>
+              <a:buChar char="-"/>
+            </a:pPr>
+            <a:r>
+              <a:rPr lang="fr-FR" dirty="0"/>
+              <a:t>Architecture technique de la solution (</a:t>
+            </a:r>
+            <a:r>
+              <a:rPr lang="fr-FR" b="1" dirty="0"/>
+              <a:t>ne pas montrer de lignes de code</a:t>
+            </a:r>
+            <a:r>
+              <a:rPr lang="fr-FR" dirty="0"/>
+              <a:t>)</a:t>
+            </a:r>
+          </a:p>
+          <a:p>
+            <a:pPr marL="628650" lvl="1" indent="-171450">
+              <a:buFontTx/>
+              <a:buChar char="-"/>
+            </a:pPr>
+            <a:r>
+              <a:rPr lang="fr-FR" dirty="0"/>
+              <a:t>Présenter l’expérience</a:t>
             </a:r>
           </a:p>
           <a:p>
@@ -1391,7 +1113,7 @@
     </p:spTree>
     <p:extLst>
       <p:ext uri="{BB962C8B-B14F-4D97-AF65-F5344CB8AC3E}">
-        <p14:creationId xmlns:p14="http://schemas.microsoft.com/office/powerpoint/2010/main" val="4024928316"/>
+        <p14:creationId xmlns:p14="http://schemas.microsoft.com/office/powerpoint/2010/main" val="424721162"/>
       </p:ext>
     </p:extLst>
   </p:cSld>
@@ -1451,7 +1173,7 @@
             </a:pPr>
             <a:r>
               <a:rPr lang="fr-FR" dirty="0"/>
-              <a:t>Vie du projet</a:t>
+              <a:t>Nous avons cherché une plateforme de communication interne simple et complète : </a:t>
             </a:r>
           </a:p>
           <a:p>
@@ -1461,7 +1183,7 @@
             </a:pPr>
             <a:r>
               <a:rPr lang="fr-FR" dirty="0"/>
-              <a:t>Organisation interne</a:t>
+              <a:t>Organiser nos réunions.</a:t>
             </a:r>
           </a:p>
           <a:p>
@@ -1471,15 +1193,7 @@
             </a:pPr>
             <a:r>
               <a:rPr lang="fr-FR" dirty="0"/>
-              <a:t>Architecture technique de la solution (</a:t>
-            </a:r>
-            <a:r>
-              <a:rPr lang="fr-FR" b="1" dirty="0"/>
-              <a:t>ne pas montrer de lignes de code</a:t>
-            </a:r>
-            <a:r>
-              <a:rPr lang="fr-FR" dirty="0"/>
-              <a:t>)</a:t>
+              <a:t>Communiquer par messages sur nos avancements respectifs.</a:t>
             </a:r>
           </a:p>
           <a:p>
@@ -1489,10 +1203,24 @@
             </a:pPr>
             <a:r>
               <a:rPr lang="fr-FR" dirty="0"/>
-              <a:t>Présenter l’expérience</a:t>
-            </a:r>
-          </a:p>
-          <a:p>
+              <a:t>Avoir la possibilité de travailler depuis chez soi.</a:t>
+            </a:r>
+          </a:p>
+          <a:p>
+            <a:pPr marL="628650" lvl="1" indent="-171450">
+              <a:buFontTx/>
+              <a:buChar char="-"/>
+            </a:pPr>
+            <a:r>
+              <a:rPr lang="fr-FR" dirty="0"/>
+              <a:t>L’outil Discord a parfaitement répondu à ces besoins.</a:t>
+            </a:r>
+          </a:p>
+          <a:p>
+            <a:pPr marL="628650" lvl="1" indent="-171450">
+              <a:buFontTx/>
+              <a:buChar char="-"/>
+            </a:pPr>
             <a:endParaRPr lang="fr-FR" dirty="0"/>
           </a:p>
         </p:txBody>
@@ -1523,7 +1251,7 @@
     </p:spTree>
     <p:extLst>
       <p:ext uri="{BB962C8B-B14F-4D97-AF65-F5344CB8AC3E}">
-        <p14:creationId xmlns:p14="http://schemas.microsoft.com/office/powerpoint/2010/main" val="424721162"/>
+        <p14:creationId xmlns:p14="http://schemas.microsoft.com/office/powerpoint/2010/main" val="2023910999"/>
       </p:ext>
     </p:extLst>
   </p:cSld>
@@ -1577,50 +1305,6 @@
           <a:bodyPr/>
           <a:lstStyle/>
           <a:p>
-            <a:pPr marL="171450" indent="-171450">
-              <a:buFontTx/>
-              <a:buChar char="-"/>
-            </a:pPr>
-            <a:r>
-              <a:rPr lang="fr-FR" dirty="0"/>
-              <a:t>Nous avons cherché une plateforme de communication interne simple et complète : </a:t>
-            </a:r>
-          </a:p>
-          <a:p>
-            <a:pPr marL="628650" lvl="1" indent="-171450">
-              <a:buFontTx/>
-              <a:buChar char="-"/>
-            </a:pPr>
-            <a:r>
-              <a:rPr lang="fr-FR" dirty="0"/>
-              <a:t>pouvoir organiser nos réunions, </a:t>
-            </a:r>
-          </a:p>
-          <a:p>
-            <a:pPr marL="628650" lvl="1" indent="-171450">
-              <a:buFontTx/>
-              <a:buChar char="-"/>
-            </a:pPr>
-            <a:r>
-              <a:rPr lang="fr-FR" dirty="0"/>
-              <a:t>communiquer par messages sur nos avancements respectifs</a:t>
-            </a:r>
-          </a:p>
-          <a:p>
-            <a:pPr marL="628650" lvl="1" indent="-171450">
-              <a:buFontTx/>
-              <a:buChar char="-"/>
-            </a:pPr>
-            <a:r>
-              <a:rPr lang="fr-FR" dirty="0"/>
-              <a:t>L’outil Discord a parfaitement répondu à ces besoins.</a:t>
-            </a:r>
-          </a:p>
-          <a:p>
-            <a:pPr marL="628650" lvl="1" indent="-171450">
-              <a:buFontTx/>
-              <a:buChar char="-"/>
-            </a:pPr>
             <a:endParaRPr lang="fr-FR" dirty="0"/>
           </a:p>
         </p:txBody>
@@ -1651,7 +1335,7 @@
     </p:spTree>
     <p:extLst>
       <p:ext uri="{BB962C8B-B14F-4D97-AF65-F5344CB8AC3E}">
-        <p14:creationId xmlns:p14="http://schemas.microsoft.com/office/powerpoint/2010/main" val="2023910999"/>
+        <p14:creationId xmlns:p14="http://schemas.microsoft.com/office/powerpoint/2010/main" val="1715738850"/>
       </p:ext>
     </p:extLst>
   </p:cSld>
@@ -1735,7 +1419,7 @@
     </p:spTree>
     <p:extLst>
       <p:ext uri="{BB962C8B-B14F-4D97-AF65-F5344CB8AC3E}">
-        <p14:creationId xmlns:p14="http://schemas.microsoft.com/office/powerpoint/2010/main" val="1715738850"/>
+        <p14:creationId xmlns:p14="http://schemas.microsoft.com/office/powerpoint/2010/main" val="889916414"/>
       </p:ext>
     </p:extLst>
   </p:cSld>
@@ -1819,7 +1503,7 @@
     </p:spTree>
     <p:extLst>
       <p:ext uri="{BB962C8B-B14F-4D97-AF65-F5344CB8AC3E}">
-        <p14:creationId xmlns:p14="http://schemas.microsoft.com/office/powerpoint/2010/main" val="889916414"/>
+        <p14:creationId xmlns:p14="http://schemas.microsoft.com/office/powerpoint/2010/main" val="196790571"/>
       </p:ext>
     </p:extLst>
   </p:cSld>
@@ -1976,7 +1660,7 @@
           <a:p>
             <a:fld id="{B35E8903-3DB0-4D62-9C06-CFA6198553C9}" type="datetimeFigureOut">
               <a:rPr lang="fr-FR" smtClean="0"/>
-              <a:t>19/05/2024</a:t>
+              <a:t>21/05/2024</a:t>
             </a:fld>
             <a:endParaRPr lang="fr-FR"/>
           </a:p>
@@ -2177,7 +1861,7 @@
           <a:p>
             <a:fld id="{B35E8903-3DB0-4D62-9C06-CFA6198553C9}" type="datetimeFigureOut">
               <a:rPr lang="fr-FR" smtClean="0"/>
-              <a:t>19/05/2024</a:t>
+              <a:t>21/05/2024</a:t>
             </a:fld>
             <a:endParaRPr lang="fr-FR"/>
           </a:p>
@@ -2388,7 +2072,7 @@
           <a:p>
             <a:fld id="{B35E8903-3DB0-4D62-9C06-CFA6198553C9}" type="datetimeFigureOut">
               <a:rPr lang="fr-FR" smtClean="0"/>
-              <a:t>19/05/2024</a:t>
+              <a:t>21/05/2024</a:t>
             </a:fld>
             <a:endParaRPr lang="fr-FR"/>
           </a:p>
@@ -2589,7 +2273,7 @@
           <a:p>
             <a:fld id="{B35E8903-3DB0-4D62-9C06-CFA6198553C9}" type="datetimeFigureOut">
               <a:rPr lang="fr-FR" smtClean="0"/>
-              <a:t>19/05/2024</a:t>
+              <a:t>21/05/2024</a:t>
             </a:fld>
             <a:endParaRPr lang="fr-FR"/>
           </a:p>
@@ -2867,7 +2551,7 @@
           <a:p>
             <a:fld id="{B35E8903-3DB0-4D62-9C06-CFA6198553C9}" type="datetimeFigureOut">
               <a:rPr lang="fr-FR" smtClean="0"/>
-              <a:t>19/05/2024</a:t>
+              <a:t>21/05/2024</a:t>
             </a:fld>
             <a:endParaRPr lang="fr-FR"/>
           </a:p>
@@ -3135,7 +2819,7 @@
           <a:p>
             <a:fld id="{B35E8903-3DB0-4D62-9C06-CFA6198553C9}" type="datetimeFigureOut">
               <a:rPr lang="fr-FR" smtClean="0"/>
-              <a:t>19/05/2024</a:t>
+              <a:t>21/05/2024</a:t>
             </a:fld>
             <a:endParaRPr lang="fr-FR"/>
           </a:p>
@@ -3550,7 +3234,7 @@
           <a:p>
             <a:fld id="{B35E8903-3DB0-4D62-9C06-CFA6198553C9}" type="datetimeFigureOut">
               <a:rPr lang="fr-FR" smtClean="0"/>
-              <a:t>19/05/2024</a:t>
+              <a:t>21/05/2024</a:t>
             </a:fld>
             <a:endParaRPr lang="fr-FR"/>
           </a:p>
@@ -3694,7 +3378,7 @@
           <a:p>
             <a:fld id="{B35E8903-3DB0-4D62-9C06-CFA6198553C9}" type="datetimeFigureOut">
               <a:rPr lang="fr-FR" smtClean="0"/>
-              <a:t>19/05/2024</a:t>
+              <a:t>21/05/2024</a:t>
             </a:fld>
             <a:endParaRPr lang="fr-FR"/>
           </a:p>
@@ -3810,7 +3494,7 @@
           <a:p>
             <a:fld id="{B35E8903-3DB0-4D62-9C06-CFA6198553C9}" type="datetimeFigureOut">
               <a:rPr lang="fr-FR" smtClean="0"/>
-              <a:t>19/05/2024</a:t>
+              <a:t>21/05/2024</a:t>
             </a:fld>
             <a:endParaRPr lang="fr-FR"/>
           </a:p>
@@ -4124,7 +3808,7 @@
           <a:p>
             <a:fld id="{B35E8903-3DB0-4D62-9C06-CFA6198553C9}" type="datetimeFigureOut">
               <a:rPr lang="fr-FR" smtClean="0"/>
-              <a:t>19/05/2024</a:t>
+              <a:t>21/05/2024</a:t>
             </a:fld>
             <a:endParaRPr lang="fr-FR"/>
           </a:p>
@@ -4415,7 +4099,7 @@
           <a:p>
             <a:fld id="{B35E8903-3DB0-4D62-9C06-CFA6198553C9}" type="datetimeFigureOut">
               <a:rPr lang="fr-FR" smtClean="0"/>
-              <a:t>19/05/2024</a:t>
+              <a:t>21/05/2024</a:t>
             </a:fld>
             <a:endParaRPr lang="fr-FR"/>
           </a:p>
@@ -4662,7 +4346,7 @@
           <a:p>
             <a:fld id="{B35E8903-3DB0-4D62-9C06-CFA6198553C9}" type="datetimeFigureOut">
               <a:rPr lang="fr-FR" smtClean="0"/>
-              <a:t>19/05/2024</a:t>
+              <a:t>21/05/2024</a:t>
             </a:fld>
             <a:endParaRPr lang="fr-FR"/>
           </a:p>
@@ -5544,133 +5228,6 @@
           <p:cNvPr id="3" name="Rectangle 2">
             <a:extLst>
               <a:ext uri="{FF2B5EF4-FFF2-40B4-BE49-F238E27FC236}">
-                <a16:creationId xmlns:a16="http://schemas.microsoft.com/office/drawing/2014/main" id="{0CA1A0A2-64BA-26D8-B011-DE0C7E7780AB}"/>
-              </a:ext>
-            </a:extLst>
-          </p:cNvPr>
-          <p:cNvSpPr/>
-          <p:nvPr/>
-        </p:nvSpPr>
-        <p:spPr>
-          <a:xfrm>
-            <a:off x="0" y="0"/>
-            <a:ext cx="12192000" cy="6858000"/>
-          </a:xfrm>
-          <a:prstGeom prst="rect">
-            <a:avLst/>
-          </a:prstGeom>
-          <a:solidFill>
-            <a:srgbClr val="1C62CA"/>
-          </a:solidFill>
-          <a:ln>
-            <a:noFill/>
-          </a:ln>
-        </p:spPr>
-        <p:style>
-          <a:lnRef idx="2">
-            <a:schemeClr val="accent1">
-              <a:shade val="15000"/>
-            </a:schemeClr>
-          </a:lnRef>
-          <a:fillRef idx="1">
-            <a:schemeClr val="accent1"/>
-          </a:fillRef>
-          <a:effectRef idx="0">
-            <a:schemeClr val="accent1"/>
-          </a:effectRef>
-          <a:fontRef idx="minor">
-            <a:schemeClr val="lt1"/>
-          </a:fontRef>
-        </p:style>
-        <p:txBody>
-          <a:bodyPr rtlCol="0" anchor="ctr"/>
-          <a:lstStyle/>
-          <a:p>
-            <a:pPr algn="ctr"/>
-            <a:endParaRPr lang="fr-FR"/>
-          </a:p>
-        </p:txBody>
-      </p:sp>
-      <p:sp>
-        <p:nvSpPr>
-          <p:cNvPr id="2" name="Titre 1">
-            <a:extLst>
-              <a:ext uri="{FF2B5EF4-FFF2-40B4-BE49-F238E27FC236}">
-                <a16:creationId xmlns:a16="http://schemas.microsoft.com/office/drawing/2014/main" id="{3C2ABF41-BFFD-A046-D6CD-B22EFF188F48}"/>
-              </a:ext>
-            </a:extLst>
-          </p:cNvPr>
-          <p:cNvSpPr>
-            <a:spLocks noGrp="1"/>
-          </p:cNvSpPr>
-          <p:nvPr>
-            <p:ph type="title"/>
-          </p:nvPr>
-        </p:nvSpPr>
-        <p:spPr>
-          <a:xfrm>
-            <a:off x="2988128" y="2766218"/>
-            <a:ext cx="6215743" cy="1325563"/>
-          </a:xfrm>
-        </p:spPr>
-        <p:txBody>
-          <a:bodyPr>
-            <a:normAutofit/>
-          </a:bodyPr>
-          <a:lstStyle/>
-          <a:p>
-            <a:pPr algn="ctr"/>
-            <a:r>
-              <a:rPr lang="fr-FR" sz="4800" dirty="0">
-                <a:solidFill>
-                  <a:schemeClr val="bg1"/>
-                </a:solidFill>
-                <a:latin typeface="Kanit SemiBold" pitchFamily="2" charset="-34"/>
-                <a:cs typeface="Kanit SemiBold" pitchFamily="2" charset="-34"/>
-              </a:rPr>
-              <a:t>Bilans individuels</a:t>
-            </a:r>
-          </a:p>
-        </p:txBody>
-      </p:sp>
-    </p:spTree>
-    <p:extLst>
-      <p:ext uri="{BB962C8B-B14F-4D97-AF65-F5344CB8AC3E}">
-        <p14:creationId xmlns:p14="http://schemas.microsoft.com/office/powerpoint/2010/main" val="147937431"/>
-      </p:ext>
-    </p:extLst>
-  </p:cSld>
-  <p:clrMapOvr>
-    <a:masterClrMapping/>
-  </p:clrMapOvr>
-  <p:transition spd="slow">
-    <p:push/>
-  </p:transition>
-</p:sld>
-</file>
-
-<file path=ppt/slides/slide11.xml><?xml version="1.0" encoding="utf-8"?>
-<p:sld xmlns:a="http://schemas.openxmlformats.org/drawingml/2006/main" xmlns:r="http://schemas.openxmlformats.org/officeDocument/2006/relationships" xmlns:p="http://schemas.openxmlformats.org/presentationml/2006/main">
-  <p:cSld>
-    <p:spTree>
-      <p:nvGrpSpPr>
-        <p:cNvPr id="1" name=""/>
-        <p:cNvGrpSpPr/>
-        <p:nvPr/>
-      </p:nvGrpSpPr>
-      <p:grpSpPr>
-        <a:xfrm>
-          <a:off x="0" y="0"/>
-          <a:ext cx="0" cy="0"/>
-          <a:chOff x="0" y="0"/>
-          <a:chExt cx="0" cy="0"/>
-        </a:xfrm>
-      </p:grpSpPr>
-      <p:sp>
-        <p:nvSpPr>
-          <p:cNvPr id="3" name="Rectangle 2">
-            <a:extLst>
-              <a:ext uri="{FF2B5EF4-FFF2-40B4-BE49-F238E27FC236}">
                 <a16:creationId xmlns:a16="http://schemas.microsoft.com/office/drawing/2014/main" id="{7BF4B955-A449-E8AF-3C4A-AECBF86B4620}"/>
               </a:ext>
             </a:extLst>
@@ -5803,7 +5360,7 @@
 </p:sld>
 </file>
 
-<file path=ppt/slides/slide12.xml><?xml version="1.0" encoding="utf-8"?>
+<file path=ppt/slides/slide11.xml><?xml version="1.0" encoding="utf-8"?>
 <p:sld xmlns:a="http://schemas.openxmlformats.org/drawingml/2006/main" xmlns:r="http://schemas.openxmlformats.org/officeDocument/2006/relationships" xmlns:p="http://schemas.openxmlformats.org/presentationml/2006/main">
   <p:cSld>
     <p:spTree>
@@ -6008,240 +5565,6 @@
           </a:p>
         </p:txBody>
       </p:sp>
-      <p:pic>
-        <p:nvPicPr>
-          <p:cNvPr id="9" name="Graphique 8" descr="Enregistrer avec un remplissage uni">
-            <a:extLst>
-              <a:ext uri="{FF2B5EF4-FFF2-40B4-BE49-F238E27FC236}">
-                <a16:creationId xmlns:a16="http://schemas.microsoft.com/office/drawing/2014/main" id="{4370B58A-856D-2E4A-E28E-056A9ECC0603}"/>
-              </a:ext>
-            </a:extLst>
-          </p:cNvPr>
-          <p:cNvPicPr>
-            <a:picLocks noChangeAspect="1"/>
-          </p:cNvPicPr>
-          <p:nvPr/>
-        </p:nvPicPr>
-        <p:blipFill>
-          <a:blip r:embed="rId3">
-            <a:extLst>
-              <a:ext uri="{28A0092B-C50C-407E-A947-70E740481C1C}">
-                <a14:useLocalDpi xmlns:a14="http://schemas.microsoft.com/office/drawing/2010/main" val="0"/>
-              </a:ext>
-              <a:ext uri="{96DAC541-7B7A-43D3-8B79-37D633B846F1}">
-                <asvg:svgBlip xmlns:asvg="http://schemas.microsoft.com/office/drawing/2016/SVG/main" r:embed="rId4"/>
-              </a:ext>
-            </a:extLst>
-          </a:blip>
-          <a:stretch>
-            <a:fillRect/>
-          </a:stretch>
-        </p:blipFill>
-        <p:spPr>
-          <a:xfrm>
-            <a:off x="1379247" y="889739"/>
-            <a:ext cx="1608881" cy="1608881"/>
-          </a:xfrm>
-          <a:prstGeom prst="rect">
-            <a:avLst/>
-          </a:prstGeom>
-        </p:spPr>
-      </p:pic>
-      <p:pic>
-        <p:nvPicPr>
-          <p:cNvPr id="11" name="Graphique 10" descr="Flèches de chevron avec un remplissage uni">
-            <a:extLst>
-              <a:ext uri="{FF2B5EF4-FFF2-40B4-BE49-F238E27FC236}">
-                <a16:creationId xmlns:a16="http://schemas.microsoft.com/office/drawing/2014/main" id="{BD32104C-8979-8B54-45F3-D2F2C316504F}"/>
-              </a:ext>
-            </a:extLst>
-          </p:cNvPr>
-          <p:cNvPicPr>
-            <a:picLocks noChangeAspect="1"/>
-          </p:cNvPicPr>
-          <p:nvPr/>
-        </p:nvPicPr>
-        <p:blipFill>
-          <a:blip r:embed="rId5">
-            <a:extLst>
-              <a:ext uri="{28A0092B-C50C-407E-A947-70E740481C1C}">
-                <a14:useLocalDpi xmlns:a14="http://schemas.microsoft.com/office/drawing/2010/main" val="0"/>
-              </a:ext>
-              <a:ext uri="{96DAC541-7B7A-43D3-8B79-37D633B846F1}">
-                <asvg:svgBlip xmlns:asvg="http://schemas.microsoft.com/office/drawing/2016/SVG/main" r:embed="rId6"/>
-              </a:ext>
-            </a:extLst>
-          </a:blip>
-          <a:stretch>
-            <a:fillRect/>
-          </a:stretch>
-        </p:blipFill>
-        <p:spPr>
-          <a:xfrm>
-            <a:off x="4722837" y="838245"/>
-            <a:ext cx="1392778" cy="1392778"/>
-          </a:xfrm>
-          <a:prstGeom prst="rect">
-            <a:avLst/>
-          </a:prstGeom>
-        </p:spPr>
-      </p:pic>
-      <p:pic>
-        <p:nvPicPr>
-          <p:cNvPr id="13" name="Graphique 12" descr="Terminal Cmd avec un remplissage uni">
-            <a:extLst>
-              <a:ext uri="{FF2B5EF4-FFF2-40B4-BE49-F238E27FC236}">
-                <a16:creationId xmlns:a16="http://schemas.microsoft.com/office/drawing/2014/main" id="{A34C1630-E00D-F7FA-9414-E4A72BFEE00F}"/>
-              </a:ext>
-            </a:extLst>
-          </p:cNvPr>
-          <p:cNvPicPr>
-            <a:picLocks noChangeAspect="1"/>
-          </p:cNvPicPr>
-          <p:nvPr/>
-        </p:nvPicPr>
-        <p:blipFill>
-          <a:blip r:embed="rId7">
-            <a:extLst>
-              <a:ext uri="{28A0092B-C50C-407E-A947-70E740481C1C}">
-                <a14:useLocalDpi xmlns:a14="http://schemas.microsoft.com/office/drawing/2010/main" val="0"/>
-              </a:ext>
-              <a:ext uri="{96DAC541-7B7A-43D3-8B79-37D633B846F1}">
-                <asvg:svgBlip xmlns:asvg="http://schemas.microsoft.com/office/drawing/2016/SVG/main" r:embed="rId8"/>
-              </a:ext>
-            </a:extLst>
-          </a:blip>
-          <a:stretch>
-            <a:fillRect/>
-          </a:stretch>
-        </p:blipFill>
-        <p:spPr>
-          <a:xfrm>
-            <a:off x="9203871" y="522250"/>
-            <a:ext cx="2024767" cy="2024767"/>
-          </a:xfrm>
-          <a:prstGeom prst="rect">
-            <a:avLst/>
-          </a:prstGeom>
-        </p:spPr>
-      </p:pic>
-      <p:pic>
-        <p:nvPicPr>
-          <p:cNvPr id="15" name="Graphique 14" descr="Flèche : incurvée dans le sens des aiguilles d’une montre avec un remplissage uni">
-            <a:extLst>
-              <a:ext uri="{FF2B5EF4-FFF2-40B4-BE49-F238E27FC236}">
-                <a16:creationId xmlns:a16="http://schemas.microsoft.com/office/drawing/2014/main" id="{46212A36-3331-7EA9-70FD-E6C39CC37D52}"/>
-              </a:ext>
-            </a:extLst>
-          </p:cNvPr>
-          <p:cNvPicPr>
-            <a:picLocks noChangeAspect="1"/>
-          </p:cNvPicPr>
-          <p:nvPr/>
-        </p:nvPicPr>
-        <p:blipFill>
-          <a:blip r:embed="rId9">
-            <a:extLst>
-              <a:ext uri="{28A0092B-C50C-407E-A947-70E740481C1C}">
-                <a14:useLocalDpi xmlns:a14="http://schemas.microsoft.com/office/drawing/2010/main" val="0"/>
-              </a:ext>
-              <a:ext uri="{96DAC541-7B7A-43D3-8B79-37D633B846F1}">
-                <asvg:svgBlip xmlns:asvg="http://schemas.microsoft.com/office/drawing/2016/SVG/main" r:embed="rId10"/>
-              </a:ext>
-            </a:extLst>
-          </a:blip>
-          <a:stretch>
-            <a:fillRect/>
-          </a:stretch>
-        </p:blipFill>
-        <p:spPr>
-          <a:xfrm rot="5050445">
-            <a:off x="9998281" y="5034986"/>
-            <a:ext cx="1846838" cy="1846838"/>
-          </a:xfrm>
-          <a:prstGeom prst="rect">
-            <a:avLst/>
-          </a:prstGeom>
-        </p:spPr>
-      </p:pic>
-      <p:pic>
-        <p:nvPicPr>
-          <p:cNvPr id="17" name="Graphique 16" descr="Avis des clients avec un remplissage uni">
-            <a:extLst>
-              <a:ext uri="{FF2B5EF4-FFF2-40B4-BE49-F238E27FC236}">
-                <a16:creationId xmlns:a16="http://schemas.microsoft.com/office/drawing/2014/main" id="{1F6F256C-7271-4214-2E86-84EC1881C7AB}"/>
-              </a:ext>
-            </a:extLst>
-          </p:cNvPr>
-          <p:cNvPicPr>
-            <a:picLocks noChangeAspect="1"/>
-          </p:cNvPicPr>
-          <p:nvPr/>
-        </p:nvPicPr>
-        <p:blipFill>
-          <a:blip r:embed="rId11">
-            <a:extLst>
-              <a:ext uri="{28A0092B-C50C-407E-A947-70E740481C1C}">
-                <a14:useLocalDpi xmlns:a14="http://schemas.microsoft.com/office/drawing/2010/main" val="0"/>
-              </a:ext>
-              <a:ext uri="{96DAC541-7B7A-43D3-8B79-37D633B846F1}">
-                <asvg:svgBlip xmlns:asvg="http://schemas.microsoft.com/office/drawing/2016/SVG/main" r:embed="rId12"/>
-              </a:ext>
-            </a:extLst>
-          </a:blip>
-          <a:stretch>
-            <a:fillRect/>
-          </a:stretch>
-        </p:blipFill>
-        <p:spPr>
-          <a:xfrm>
-            <a:off x="1144740" y="4091781"/>
-            <a:ext cx="2299192" cy="2299192"/>
-          </a:xfrm>
-          <a:prstGeom prst="rect">
-            <a:avLst/>
-          </a:prstGeom>
-        </p:spPr>
-      </p:pic>
-      <p:pic>
-        <p:nvPicPr>
-          <p:cNvPr id="19" name="Graphique 18" descr="Télécharger contour">
-            <a:extLst>
-              <a:ext uri="{FF2B5EF4-FFF2-40B4-BE49-F238E27FC236}">
-                <a16:creationId xmlns:a16="http://schemas.microsoft.com/office/drawing/2014/main" id="{AC630009-3AE2-C49B-35E6-D851D6537CDA}"/>
-              </a:ext>
-            </a:extLst>
-          </p:cNvPr>
-          <p:cNvPicPr>
-            <a:picLocks noChangeAspect="1"/>
-          </p:cNvPicPr>
-          <p:nvPr/>
-        </p:nvPicPr>
-        <p:blipFill>
-          <a:blip r:embed="rId13">
-            <a:extLst>
-              <a:ext uri="{28A0092B-C50C-407E-A947-70E740481C1C}">
-                <a14:useLocalDpi xmlns:a14="http://schemas.microsoft.com/office/drawing/2010/main" val="0"/>
-              </a:ext>
-              <a:ext uri="{96DAC541-7B7A-43D3-8B79-37D633B846F1}">
-                <asvg:svgBlip xmlns:asvg="http://schemas.microsoft.com/office/drawing/2016/SVG/main" r:embed="rId14"/>
-              </a:ext>
-            </a:extLst>
-          </a:blip>
-          <a:stretch>
-            <a:fillRect/>
-          </a:stretch>
-        </p:blipFill>
-        <p:spPr>
-          <a:xfrm>
-            <a:off x="5293312" y="4674948"/>
-            <a:ext cx="2061179" cy="2061179"/>
-          </a:xfrm>
-          <a:prstGeom prst="rect">
-            <a:avLst/>
-          </a:prstGeom>
-        </p:spPr>
-      </p:pic>
     </p:spTree>
     <p:extLst>
       <p:ext uri="{BB962C8B-B14F-4D97-AF65-F5344CB8AC3E}">
@@ -6313,261 +5636,6 @@
                                   </p:childTnLst>
                                 </p:cTn>
                               </p:par>
-                              <p:par>
-                                <p:cTn id="8" presetID="10" presetClass="entr" presetSubtype="0" fill="hold" nodeType="withEffect">
-                                  <p:stCondLst>
-                                    <p:cond delay="500"/>
-                                  </p:stCondLst>
-                                  <p:childTnLst>
-                                    <p:set>
-                                      <p:cBhvr>
-                                        <p:cTn id="9" dur="1" fill="hold">
-                                          <p:stCondLst>
-                                            <p:cond delay="0"/>
-                                          </p:stCondLst>
-                                        </p:cTn>
-                                        <p:tgtEl>
-                                          <p:spTgt spid="9"/>
-                                        </p:tgtEl>
-                                        <p:attrNameLst>
-                                          <p:attrName>style.visibility</p:attrName>
-                                        </p:attrNameLst>
-                                      </p:cBhvr>
-                                      <p:to>
-                                        <p:strVal val="visible"/>
-                                      </p:to>
-                                    </p:set>
-                                    <p:animEffect transition="in" filter="fade">
-                                      <p:cBhvr>
-                                        <p:cTn id="10" dur="500"/>
-                                        <p:tgtEl>
-                                          <p:spTgt spid="9"/>
-                                        </p:tgtEl>
-                                      </p:cBhvr>
-                                    </p:animEffect>
-                                  </p:childTnLst>
-                                </p:cTn>
-                              </p:par>
-                            </p:childTnLst>
-                          </p:cTn>
-                        </p:par>
-                        <p:par>
-                          <p:cTn id="11" fill="hold">
-                            <p:stCondLst>
-                              <p:cond delay="1000"/>
-                            </p:stCondLst>
-                            <p:childTnLst>
-                              <p:par>
-                                <p:cTn id="12" presetID="10" presetClass="entr" presetSubtype="0" fill="hold" nodeType="afterEffect">
-                                  <p:stCondLst>
-                                    <p:cond delay="0"/>
-                                  </p:stCondLst>
-                                  <p:childTnLst>
-                                    <p:set>
-                                      <p:cBhvr>
-                                        <p:cTn id="13" dur="1" fill="hold">
-                                          <p:stCondLst>
-                                            <p:cond delay="0"/>
-                                          </p:stCondLst>
-                                        </p:cTn>
-                                        <p:tgtEl>
-                                          <p:spTgt spid="11"/>
-                                        </p:tgtEl>
-                                        <p:attrNameLst>
-                                          <p:attrName>style.visibility</p:attrName>
-                                        </p:attrNameLst>
-                                      </p:cBhvr>
-                                      <p:to>
-                                        <p:strVal val="visible"/>
-                                      </p:to>
-                                    </p:set>
-                                    <p:animEffect transition="in" filter="fade">
-                                      <p:cBhvr>
-                                        <p:cTn id="14" dur="500"/>
-                                        <p:tgtEl>
-                                          <p:spTgt spid="11"/>
-                                        </p:tgtEl>
-                                      </p:cBhvr>
-                                    </p:animEffect>
-                                  </p:childTnLst>
-                                </p:cTn>
-                              </p:par>
-                            </p:childTnLst>
-                          </p:cTn>
-                        </p:par>
-                        <p:par>
-                          <p:cTn id="15" fill="hold">
-                            <p:stCondLst>
-                              <p:cond delay="1500"/>
-                            </p:stCondLst>
-                            <p:childTnLst>
-                              <p:par>
-                                <p:cTn id="16" presetID="10" presetClass="entr" presetSubtype="0" fill="hold" nodeType="afterEffect">
-                                  <p:stCondLst>
-                                    <p:cond delay="0"/>
-                                  </p:stCondLst>
-                                  <p:childTnLst>
-                                    <p:set>
-                                      <p:cBhvr>
-                                        <p:cTn id="17" dur="1" fill="hold">
-                                          <p:stCondLst>
-                                            <p:cond delay="0"/>
-                                          </p:stCondLst>
-                                        </p:cTn>
-                                        <p:tgtEl>
-                                          <p:spTgt spid="17"/>
-                                        </p:tgtEl>
-                                        <p:attrNameLst>
-                                          <p:attrName>style.visibility</p:attrName>
-                                        </p:attrNameLst>
-                                      </p:cBhvr>
-                                      <p:to>
-                                        <p:strVal val="visible"/>
-                                      </p:to>
-                                    </p:set>
-                                    <p:animEffect transition="in" filter="fade">
-                                      <p:cBhvr>
-                                        <p:cTn id="18" dur="500"/>
-                                        <p:tgtEl>
-                                          <p:spTgt spid="17"/>
-                                        </p:tgtEl>
-                                      </p:cBhvr>
-                                    </p:animEffect>
-                                  </p:childTnLst>
-                                </p:cTn>
-                              </p:par>
-                            </p:childTnLst>
-                          </p:cTn>
-                        </p:par>
-                        <p:par>
-                          <p:cTn id="19" fill="hold">
-                            <p:stCondLst>
-                              <p:cond delay="2000"/>
-                            </p:stCondLst>
-                            <p:childTnLst>
-                              <p:par>
-                                <p:cTn id="20" presetID="10" presetClass="entr" presetSubtype="0" fill="hold" nodeType="afterEffect">
-                                  <p:stCondLst>
-                                    <p:cond delay="0"/>
-                                  </p:stCondLst>
-                                  <p:childTnLst>
-                                    <p:set>
-                                      <p:cBhvr>
-                                        <p:cTn id="21" dur="1" fill="hold">
-                                          <p:stCondLst>
-                                            <p:cond delay="0"/>
-                                          </p:stCondLst>
-                                        </p:cTn>
-                                        <p:tgtEl>
-                                          <p:spTgt spid="19"/>
-                                        </p:tgtEl>
-                                        <p:attrNameLst>
-                                          <p:attrName>style.visibility</p:attrName>
-                                        </p:attrNameLst>
-                                      </p:cBhvr>
-                                      <p:to>
-                                        <p:strVal val="visible"/>
-                                      </p:to>
-                                    </p:set>
-                                    <p:animEffect transition="in" filter="fade">
-                                      <p:cBhvr>
-                                        <p:cTn id="22" dur="500"/>
-                                        <p:tgtEl>
-                                          <p:spTgt spid="19"/>
-                                        </p:tgtEl>
-                                      </p:cBhvr>
-                                    </p:animEffect>
-                                  </p:childTnLst>
-                                </p:cTn>
-                              </p:par>
-                            </p:childTnLst>
-                          </p:cTn>
-                        </p:par>
-                        <p:par>
-                          <p:cTn id="23" fill="hold">
-                            <p:stCondLst>
-                              <p:cond delay="2500"/>
-                            </p:stCondLst>
-                            <p:childTnLst>
-                              <p:par>
-                                <p:cTn id="24" presetID="10" presetClass="entr" presetSubtype="0" fill="hold" nodeType="afterEffect">
-                                  <p:stCondLst>
-                                    <p:cond delay="0"/>
-                                  </p:stCondLst>
-                                  <p:childTnLst>
-                                    <p:set>
-                                      <p:cBhvr>
-                                        <p:cTn id="25" dur="1" fill="hold">
-                                          <p:stCondLst>
-                                            <p:cond delay="0"/>
-                                          </p:stCondLst>
-                                        </p:cTn>
-                                        <p:tgtEl>
-                                          <p:spTgt spid="15"/>
-                                        </p:tgtEl>
-                                        <p:attrNameLst>
-                                          <p:attrName>style.visibility</p:attrName>
-                                        </p:attrNameLst>
-                                      </p:cBhvr>
-                                      <p:to>
-                                        <p:strVal val="visible"/>
-                                      </p:to>
-                                    </p:set>
-                                    <p:animEffect transition="in" filter="fade">
-                                      <p:cBhvr>
-                                        <p:cTn id="26" dur="500"/>
-                                        <p:tgtEl>
-                                          <p:spTgt spid="15"/>
-                                        </p:tgtEl>
-                                      </p:cBhvr>
-                                    </p:animEffect>
-                                  </p:childTnLst>
-                                </p:cTn>
-                              </p:par>
-                            </p:childTnLst>
-                          </p:cTn>
-                        </p:par>
-                        <p:par>
-                          <p:cTn id="27" fill="hold">
-                            <p:stCondLst>
-                              <p:cond delay="3000"/>
-                            </p:stCondLst>
-                            <p:childTnLst>
-                              <p:par>
-                                <p:cTn id="28" presetID="10" presetClass="entr" presetSubtype="0" fill="hold" nodeType="afterEffect">
-                                  <p:stCondLst>
-                                    <p:cond delay="0"/>
-                                  </p:stCondLst>
-                                  <p:childTnLst>
-                                    <p:set>
-                                      <p:cBhvr>
-                                        <p:cTn id="29" dur="1" fill="hold">
-                                          <p:stCondLst>
-                                            <p:cond delay="0"/>
-                                          </p:stCondLst>
-                                        </p:cTn>
-                                        <p:tgtEl>
-                                          <p:spTgt spid="13"/>
-                                        </p:tgtEl>
-                                        <p:attrNameLst>
-                                          <p:attrName>style.visibility</p:attrName>
-                                        </p:attrNameLst>
-                                      </p:cBhvr>
-                                      <p:to>
-                                        <p:strVal val="visible"/>
-                                      </p:to>
-                                    </p:set>
-                                    <p:animEffect transition="in" filter="fade">
-                                      <p:cBhvr>
-                                        <p:cTn id="30" dur="500"/>
-                                        <p:tgtEl>
-                                          <p:spTgt spid="13"/>
-                                        </p:tgtEl>
-                                      </p:cBhvr>
-                                    </p:animEffect>
-                                  </p:childTnLst>
-                                </p:cTn>
-                              </p:par>
                             </p:childTnLst>
                           </p:cTn>
                         </p:par>
@@ -6724,109 +5792,6 @@
       </p:sp>
       <p:grpSp>
         <p:nvGrpSpPr>
-          <p:cNvPr id="11" name="Groupe 10">
-            <a:extLst>
-              <a:ext uri="{FF2B5EF4-FFF2-40B4-BE49-F238E27FC236}">
-                <a16:creationId xmlns:a16="http://schemas.microsoft.com/office/drawing/2014/main" id="{CFC86F5B-A2F6-8603-02E6-8CF2EFECB1CA}"/>
-              </a:ext>
-            </a:extLst>
-          </p:cNvPr>
-          <p:cNvGrpSpPr/>
-          <p:nvPr/>
-        </p:nvGrpSpPr>
-        <p:grpSpPr>
-          <a:xfrm>
-            <a:off x="376624" y="201011"/>
-            <a:ext cx="3962584" cy="3515190"/>
-            <a:chOff x="338475" y="313919"/>
-            <a:chExt cx="3962584" cy="3515190"/>
-          </a:xfrm>
-        </p:grpSpPr>
-        <p:pic>
-          <p:nvPicPr>
-            <p:cNvPr id="9" name="Image 8">
-              <a:extLst>
-                <a:ext uri="{FF2B5EF4-FFF2-40B4-BE49-F238E27FC236}">
-                  <a16:creationId xmlns:a16="http://schemas.microsoft.com/office/drawing/2014/main" id="{A23DDFFD-8BDC-6D7E-A614-E238B707AE7C}"/>
-                </a:ext>
-              </a:extLst>
-            </p:cNvPr>
-            <p:cNvPicPr>
-              <a:picLocks noChangeAspect="1"/>
-            </p:cNvPicPr>
-            <p:nvPr/>
-          </p:nvPicPr>
-          <p:blipFill>
-            <a:blip r:embed="rId3"/>
-            <a:stretch>
-              <a:fillRect/>
-            </a:stretch>
-          </p:blipFill>
-          <p:spPr>
-            <a:xfrm>
-              <a:off x="338476" y="313919"/>
-              <a:ext cx="3962583" cy="2996441"/>
-            </a:xfrm>
-            <a:prstGeom prst="rect">
-              <a:avLst/>
-            </a:prstGeom>
-            <a:ln>
-              <a:noFill/>
-            </a:ln>
-            <a:effectLst>
-              <a:outerShdw blurRad="292100" dist="139700" dir="2700000" algn="tl" rotWithShape="0">
-                <a:srgbClr val="333333">
-                  <a:alpha val="65000"/>
-                </a:srgbClr>
-              </a:outerShdw>
-            </a:effectLst>
-          </p:spPr>
-        </p:pic>
-        <p:sp>
-          <p:nvSpPr>
-            <p:cNvPr id="10" name="ZoneTexte 9">
-              <a:extLst>
-                <a:ext uri="{FF2B5EF4-FFF2-40B4-BE49-F238E27FC236}">
-                  <a16:creationId xmlns:a16="http://schemas.microsoft.com/office/drawing/2014/main" id="{EF45F8E4-5E15-A28E-EAF3-7017E26F7557}"/>
-                </a:ext>
-              </a:extLst>
-            </p:cNvPr>
-            <p:cNvSpPr txBox="1"/>
-            <p:nvPr/>
-          </p:nvSpPr>
-          <p:spPr>
-            <a:xfrm>
-              <a:off x="338475" y="3428999"/>
-              <a:ext cx="3962583" cy="400110"/>
-            </a:xfrm>
-            <a:prstGeom prst="rect">
-              <a:avLst/>
-            </a:prstGeom>
-            <a:noFill/>
-          </p:spPr>
-          <p:txBody>
-            <a:bodyPr wrap="square" rtlCol="0">
-              <a:spAutoFit/>
-            </a:bodyPr>
-            <a:lstStyle/>
-            <a:p>
-              <a:pPr algn="ctr"/>
-              <a:r>
-                <a:rPr lang="fr-FR" sz="2000" dirty="0">
-                  <a:solidFill>
-                    <a:schemeClr val="bg1"/>
-                  </a:solidFill>
-                  <a:latin typeface="Kanit" pitchFamily="2" charset="-34"/>
-                  <a:cs typeface="Kanit" pitchFamily="2" charset="-34"/>
-                </a:rPr>
-                <a:t>Premières versions de l’interface</a:t>
-              </a:r>
-            </a:p>
-          </p:txBody>
-        </p:sp>
-      </p:grpSp>
-      <p:grpSp>
-        <p:nvGrpSpPr>
           <p:cNvPr id="15" name="Groupe 14">
             <a:extLst>
               <a:ext uri="{FF2B5EF4-FFF2-40B4-BE49-F238E27FC236}">
@@ -6860,7 +5825,7 @@
             <p:nvPr/>
           </p:nvPicPr>
           <p:blipFill>
-            <a:blip r:embed="rId4">
+            <a:blip r:embed="rId3">
               <a:extLst>
                 <a:ext uri="{28A0092B-C50C-407E-A947-70E740481C1C}">
                   <a14:useLocalDpi xmlns:a14="http://schemas.microsoft.com/office/drawing/2010/main" val="0"/>
@@ -6948,7 +5913,7 @@
         </p:nvGrpSpPr>
         <p:grpSpPr>
           <a:xfrm>
-            <a:off x="6191852" y="3469604"/>
+            <a:off x="6414591" y="3357088"/>
             <a:ext cx="5925496" cy="3544791"/>
             <a:chOff x="6266504" y="3313209"/>
             <a:chExt cx="5925496" cy="3544791"/>
@@ -6969,7 +5934,7 @@
             <p:nvPr/>
           </p:nvPicPr>
           <p:blipFill>
-            <a:blip r:embed="rId5">
+            <a:blip r:embed="rId4">
               <a:extLst>
                 <a:ext uri="{28A0092B-C50C-407E-A947-70E740481C1C}">
                   <a14:useLocalDpi xmlns:a14="http://schemas.microsoft.com/office/drawing/2010/main" val="0"/>
@@ -7078,7 +6043,7 @@
             <p:nvPr/>
           </p:nvPicPr>
           <p:blipFill>
-            <a:blip r:embed="rId6">
+            <a:blip r:embed="rId5">
               <a:extLst>
                 <a:ext uri="{28A0092B-C50C-407E-A947-70E740481C1C}">
                   <a14:useLocalDpi xmlns:a14="http://schemas.microsoft.com/office/drawing/2010/main" val="0"/>
@@ -7147,6 +6112,115 @@
                   <a:cs typeface="Kanit" pitchFamily="2" charset="-34"/>
                 </a:rPr>
                 <a:t>Reconnaitre des voitures</a:t>
+              </a:r>
+            </a:p>
+          </p:txBody>
+        </p:sp>
+      </p:grpSp>
+      <p:grpSp>
+        <p:nvGrpSpPr>
+          <p:cNvPr id="19" name="Groupe 18">
+            <a:extLst>
+              <a:ext uri="{FF2B5EF4-FFF2-40B4-BE49-F238E27FC236}">
+                <a16:creationId xmlns:a16="http://schemas.microsoft.com/office/drawing/2014/main" id="{8161247E-8641-C1A4-5C3A-813E9C18D6CB}"/>
+              </a:ext>
+            </a:extLst>
+          </p:cNvPr>
+          <p:cNvGrpSpPr/>
+          <p:nvPr/>
+        </p:nvGrpSpPr>
+        <p:grpSpPr>
+          <a:xfrm>
+            <a:off x="269336" y="387259"/>
+            <a:ext cx="5437584" cy="2750595"/>
+            <a:chOff x="6294695" y="3981194"/>
+            <a:chExt cx="5437584" cy="2750595"/>
+          </a:xfrm>
+        </p:grpSpPr>
+        <p:pic>
+          <p:nvPicPr>
+            <p:cNvPr id="17" name="Image 16" descr="Une image contenant texte, capture d’écran, Logiciel multimédia, logiciel&#10;&#10;Description générée automatiquement">
+              <a:extLst>
+                <a:ext uri="{FF2B5EF4-FFF2-40B4-BE49-F238E27FC236}">
+                  <a16:creationId xmlns:a16="http://schemas.microsoft.com/office/drawing/2014/main" id="{33F43E44-E287-00B1-E811-35169CE24D69}"/>
+                </a:ext>
+              </a:extLst>
+            </p:cNvPr>
+            <p:cNvPicPr>
+              <a:picLocks noChangeAspect="1"/>
+            </p:cNvPicPr>
+            <p:nvPr/>
+          </p:nvPicPr>
+          <p:blipFill>
+            <a:blip r:embed="rId6">
+              <a:extLst>
+                <a:ext uri="{28A0092B-C50C-407E-A947-70E740481C1C}">
+                  <a14:useLocalDpi xmlns:a14="http://schemas.microsoft.com/office/drawing/2010/main" val="0"/>
+                </a:ext>
+              </a:extLst>
+            </a:blip>
+            <a:stretch>
+              <a:fillRect/>
+            </a:stretch>
+          </p:blipFill>
+          <p:spPr>
+            <a:xfrm>
+              <a:off x="7117576" y="3981194"/>
+              <a:ext cx="3791822" cy="2275093"/>
+            </a:xfrm>
+            <a:prstGeom prst="rect">
+              <a:avLst/>
+            </a:prstGeom>
+            <a:ln>
+              <a:noFill/>
+            </a:ln>
+            <a:effectLst>
+              <a:outerShdw blurRad="292100" dist="139700" dir="2700000" algn="tl" rotWithShape="0">
+                <a:srgbClr val="333333">
+                  <a:alpha val="65000"/>
+                </a:srgbClr>
+              </a:outerShdw>
+            </a:effectLst>
+          </p:spPr>
+        </p:pic>
+        <p:sp>
+          <p:nvSpPr>
+            <p:cNvPr id="18" name="ZoneTexte 17">
+              <a:extLst>
+                <a:ext uri="{FF2B5EF4-FFF2-40B4-BE49-F238E27FC236}">
+                  <a16:creationId xmlns:a16="http://schemas.microsoft.com/office/drawing/2014/main" id="{B85A7C50-D2C3-64A1-AC07-BAEEDD05FD34}"/>
+                </a:ext>
+              </a:extLst>
+            </p:cNvPr>
+            <p:cNvSpPr txBox="1"/>
+            <p:nvPr/>
+          </p:nvSpPr>
+          <p:spPr>
+            <a:xfrm>
+              <a:off x="6294695" y="6331679"/>
+              <a:ext cx="5437584" cy="400110"/>
+            </a:xfrm>
+            <a:prstGeom prst="rect">
+              <a:avLst/>
+            </a:prstGeom>
+            <a:noFill/>
+          </p:spPr>
+          <p:txBody>
+            <a:bodyPr wrap="square" rtlCol="0">
+              <a:spAutoFit/>
+            </a:bodyPr>
+            <a:lstStyle/>
+            <a:p>
+              <a:pPr algn="ctr"/>
+              <a:r>
+                <a:rPr lang="fr-FR" sz="2000" dirty="0">
+                  <a:solidFill>
+                    <a:schemeClr val="bg1"/>
+                  </a:solidFill>
+                  <a:latin typeface="Kanit" pitchFamily="2" charset="-34"/>
+                  <a:cs typeface="Kanit" pitchFamily="2" charset="-34"/>
+                </a:rPr>
+                <a:t>Une inspiration du projet : l’application Waze</a:t>
               </a:r>
             </a:p>
           </p:txBody>
@@ -7358,7 +6432,7 @@
                                           </p:stCondLst>
                                         </p:cTn>
                                         <p:tgtEl>
-                                          <p:spTgt spid="11"/>
+                                          <p:spTgt spid="19"/>
                                         </p:tgtEl>
                                         <p:attrNameLst>
                                           <p:attrName>style.visibility</p:attrName>
@@ -7372,7 +6446,7 @@
                                       <p:cBhvr>
                                         <p:cTn id="22" dur="500"/>
                                         <p:tgtEl>
-                                          <p:spTgt spid="11"/>
+                                          <p:spTgt spid="19"/>
                                         </p:tgtEl>
                                       </p:cBhvr>
                                     </p:animEffect>
@@ -7441,7 +6515,7 @@
         </p:nvSpPr>
         <p:spPr>
           <a:xfrm>
-            <a:off x="0" y="0"/>
+            <a:off x="-1" y="-1"/>
             <a:ext cx="12192000" cy="6858000"/>
           </a:xfrm>
           <a:prstGeom prst="rect">
@@ -7499,7 +6573,7 @@
         </p:nvSpPr>
         <p:spPr>
           <a:xfrm>
-            <a:off x="2988128" y="2766218"/>
+            <a:off x="1030375" y="2895172"/>
             <a:ext cx="6215743" cy="1325563"/>
           </a:xfrm>
         </p:spPr>
@@ -7523,148 +6597,12 @@
           </a:p>
         </p:txBody>
       </p:sp>
-    </p:spTree>
-    <p:extLst>
-      <p:ext uri="{BB962C8B-B14F-4D97-AF65-F5344CB8AC3E}">
-        <p14:creationId xmlns:p14="http://schemas.microsoft.com/office/powerpoint/2010/main" val="1281288877"/>
-      </p:ext>
-    </p:extLst>
-  </p:cSld>
-  <p:clrMapOvr>
-    <a:masterClrMapping/>
-  </p:clrMapOvr>
-  <p:transition spd="slow">
-    <p:push/>
-  </p:transition>
-</p:sld>
-</file>
-
-<file path=ppt/slides/slide5.xml><?xml version="1.0" encoding="utf-8"?>
-<p:sld xmlns:a="http://schemas.openxmlformats.org/drawingml/2006/main" xmlns:r="http://schemas.openxmlformats.org/officeDocument/2006/relationships" xmlns:p="http://schemas.openxmlformats.org/presentationml/2006/main">
-  <p:cSld>
-    <p:spTree>
-      <p:nvGrpSpPr>
-        <p:cNvPr id="1" name=""/>
-        <p:cNvGrpSpPr/>
-        <p:nvPr/>
-      </p:nvGrpSpPr>
-      <p:grpSpPr>
-        <a:xfrm>
-          <a:off x="0" y="0"/>
-          <a:ext cx="0" cy="0"/>
-          <a:chOff x="0" y="0"/>
-          <a:chExt cx="0" cy="0"/>
-        </a:xfrm>
-      </p:grpSpPr>
-      <p:sp>
-        <p:nvSpPr>
-          <p:cNvPr id="4" name="Rectangle 3">
-            <a:extLst>
-              <a:ext uri="{FF2B5EF4-FFF2-40B4-BE49-F238E27FC236}">
-                <a16:creationId xmlns:a16="http://schemas.microsoft.com/office/drawing/2014/main" id="{97AF87D6-6CE6-527C-2973-E806A1377C58}"/>
-              </a:ext>
-            </a:extLst>
-          </p:cNvPr>
-          <p:cNvSpPr/>
-          <p:nvPr/>
-        </p:nvSpPr>
-        <p:spPr>
-          <a:xfrm rot="10800000">
-            <a:off x="0" y="0"/>
-            <a:ext cx="12192000" cy="6858000"/>
-          </a:xfrm>
-          <a:prstGeom prst="rect">
-            <a:avLst/>
-          </a:prstGeom>
-          <a:gradFill flip="none" rotWithShape="1">
-            <a:gsLst>
-              <a:gs pos="0">
-                <a:srgbClr val="124084"/>
-              </a:gs>
-              <a:gs pos="100000">
-                <a:srgbClr val="1C62CA"/>
-              </a:gs>
-            </a:gsLst>
-            <a:lin ang="0" scaled="0"/>
-            <a:tileRect/>
-          </a:gradFill>
-          <a:ln>
-            <a:noFill/>
-          </a:ln>
-        </p:spPr>
-        <p:style>
-          <a:lnRef idx="2">
-            <a:schemeClr val="accent1">
-              <a:shade val="15000"/>
-            </a:schemeClr>
-          </a:lnRef>
-          <a:fillRef idx="1">
-            <a:schemeClr val="accent1"/>
-          </a:fillRef>
-          <a:effectRef idx="0">
-            <a:schemeClr val="accent1"/>
-          </a:effectRef>
-          <a:fontRef idx="minor">
-            <a:schemeClr val="lt1"/>
-          </a:fontRef>
-        </p:style>
-        <p:txBody>
-          <a:bodyPr rtlCol="0" anchor="ctr"/>
-          <a:lstStyle/>
-          <a:p>
-            <a:pPr algn="ctr"/>
-            <a:endParaRPr lang="fr-FR" dirty="0"/>
-          </a:p>
-        </p:txBody>
-      </p:sp>
-      <p:sp>
-        <p:nvSpPr>
-          <p:cNvPr id="2" name="Titre 1">
-            <a:extLst>
-              <a:ext uri="{FF2B5EF4-FFF2-40B4-BE49-F238E27FC236}">
-                <a16:creationId xmlns:a16="http://schemas.microsoft.com/office/drawing/2014/main" id="{3C2ABF41-BFFD-A046-D6CD-B22EFF188F48}"/>
-              </a:ext>
-            </a:extLst>
-          </p:cNvPr>
-          <p:cNvSpPr>
-            <a:spLocks noGrp="1"/>
-          </p:cNvSpPr>
-          <p:nvPr>
-            <p:ph type="title"/>
-          </p:nvPr>
-        </p:nvSpPr>
-        <p:spPr>
-          <a:xfrm>
-            <a:off x="2988128" y="2766218"/>
-            <a:ext cx="6215743" cy="1325563"/>
-          </a:xfrm>
-        </p:spPr>
-        <p:txBody>
-          <a:bodyPr>
-            <a:normAutofit/>
-          </a:bodyPr>
-          <a:lstStyle/>
-          <a:p>
-            <a:pPr algn="ctr"/>
-            <a:r>
-              <a:rPr lang="fr-FR" sz="4800" dirty="0">
-                <a:solidFill>
-                  <a:schemeClr val="bg1"/>
-                </a:solidFill>
-                <a:latin typeface="Kanit SemiBold" pitchFamily="2" charset="-34"/>
-                <a:cs typeface="Kanit SemiBold" pitchFamily="2" charset="-34"/>
-              </a:rPr>
-              <a:t>Ambitions</a:t>
-            </a:r>
-          </a:p>
-        </p:txBody>
-      </p:sp>
       <p:grpSp>
         <p:nvGrpSpPr>
-          <p:cNvPr id="19" name="Groupe 18">
-            <a:extLst>
-              <a:ext uri="{FF2B5EF4-FFF2-40B4-BE49-F238E27FC236}">
-                <a16:creationId xmlns:a16="http://schemas.microsoft.com/office/drawing/2014/main" id="{8161247E-8641-C1A4-5C3A-813E9C18D6CB}"/>
+          <p:cNvPr id="11" name="Groupe 10">
+            <a:extLst>
+              <a:ext uri="{FF2B5EF4-FFF2-40B4-BE49-F238E27FC236}">
+                <a16:creationId xmlns:a16="http://schemas.microsoft.com/office/drawing/2014/main" id="{CFC86F5B-A2F6-8603-02E6-8CF2EFECB1CA}"/>
               </a:ext>
             </a:extLst>
           </p:cNvPr>
@@ -7673,18 +6611,18 @@
         </p:nvGrpSpPr>
         <p:grpSpPr>
           <a:xfrm>
-            <a:off x="0" y="3949556"/>
-            <a:ext cx="5437584" cy="2750595"/>
-            <a:chOff x="6294695" y="3981194"/>
-            <a:chExt cx="5437584" cy="2750595"/>
+            <a:off x="7938009" y="3084888"/>
+            <a:ext cx="3962584" cy="3515190"/>
+            <a:chOff x="338475" y="313919"/>
+            <a:chExt cx="3962584" cy="3515190"/>
           </a:xfrm>
         </p:grpSpPr>
         <p:pic>
           <p:nvPicPr>
-            <p:cNvPr id="17" name="Image 16" descr="Une image contenant texte, capture d’écran, Logiciel multimédia, logiciel&#10;&#10;Description générée automatiquement">
+            <p:cNvPr id="9" name="Image 8">
               <a:extLst>
                 <a:ext uri="{FF2B5EF4-FFF2-40B4-BE49-F238E27FC236}">
-                  <a16:creationId xmlns:a16="http://schemas.microsoft.com/office/drawing/2014/main" id="{33F43E44-E287-00B1-E811-35169CE24D69}"/>
+                  <a16:creationId xmlns:a16="http://schemas.microsoft.com/office/drawing/2014/main" id="{A23DDFFD-8BDC-6D7E-A614-E238B707AE7C}"/>
                 </a:ext>
               </a:extLst>
             </p:cNvPr>
@@ -7694,21 +6632,15 @@
             <p:nvPr/>
           </p:nvPicPr>
           <p:blipFill>
-            <a:blip r:embed="rId3">
-              <a:extLst>
-                <a:ext uri="{28A0092B-C50C-407E-A947-70E740481C1C}">
-                  <a14:useLocalDpi xmlns:a14="http://schemas.microsoft.com/office/drawing/2010/main" val="0"/>
-                </a:ext>
-              </a:extLst>
-            </a:blip>
+            <a:blip r:embed="rId3"/>
             <a:stretch>
               <a:fillRect/>
             </a:stretch>
           </p:blipFill>
           <p:spPr>
             <a:xfrm>
-              <a:off x="7117576" y="3981194"/>
-              <a:ext cx="3791822" cy="2275093"/>
+              <a:off x="338476" y="313919"/>
+              <a:ext cx="3962583" cy="2996441"/>
             </a:xfrm>
             <a:prstGeom prst="rect">
               <a:avLst/>
@@ -7727,10 +6659,10 @@
         </p:pic>
         <p:sp>
           <p:nvSpPr>
-            <p:cNvPr id="18" name="ZoneTexte 17">
+            <p:cNvPr id="10" name="ZoneTexte 9">
               <a:extLst>
                 <a:ext uri="{FF2B5EF4-FFF2-40B4-BE49-F238E27FC236}">
-                  <a16:creationId xmlns:a16="http://schemas.microsoft.com/office/drawing/2014/main" id="{B85A7C50-D2C3-64A1-AC07-BAEEDD05FD34}"/>
+                  <a16:creationId xmlns:a16="http://schemas.microsoft.com/office/drawing/2014/main" id="{EF45F8E4-5E15-A28E-EAF3-7017E26F7557}"/>
                 </a:ext>
               </a:extLst>
             </p:cNvPr>
@@ -7739,8 +6671,8 @@
           </p:nvSpPr>
           <p:spPr>
             <a:xfrm>
-              <a:off x="6294695" y="6331679"/>
-              <a:ext cx="5437584" cy="400110"/>
+              <a:off x="338475" y="3428999"/>
+              <a:ext cx="3962583" cy="400110"/>
             </a:xfrm>
             <a:prstGeom prst="rect">
               <a:avLst/>
@@ -7762,7 +6694,7 @@
                   <a:latin typeface="Kanit" pitchFamily="2" charset="-34"/>
                   <a:cs typeface="Kanit" pitchFamily="2" charset="-34"/>
                 </a:rPr>
-                <a:t>Une inspiration du projet : l’application Waze</a:t>
+                <a:t>Premières versions de l’interface</a:t>
               </a:r>
             </a:p>
           </p:txBody>
@@ -7771,7 +6703,7 @@
     </p:spTree>
     <p:extLst>
       <p:ext uri="{BB962C8B-B14F-4D97-AF65-F5344CB8AC3E}">
-        <p14:creationId xmlns:p14="http://schemas.microsoft.com/office/powerpoint/2010/main" val="2079455031"/>
+        <p14:creationId xmlns:p14="http://schemas.microsoft.com/office/powerpoint/2010/main" val="1281288877"/>
       </p:ext>
     </p:extLst>
   </p:cSld>
@@ -7815,7 +6747,7 @@
                                           </p:stCondLst>
                                         </p:cTn>
                                         <p:tgtEl>
-                                          <p:spTgt spid="19"/>
+                                          <p:spTgt spid="11"/>
                                         </p:tgtEl>
                                         <p:attrNameLst>
                                           <p:attrName>style.visibility</p:attrName>
@@ -7829,7 +6761,7 @@
                                       <p:cBhvr>
                                         <p:cTn id="7" dur="500"/>
                                         <p:tgtEl>
-                                          <p:spTgt spid="19"/>
+                                          <p:spTgt spid="11"/>
                                         </p:tgtEl>
                                       </p:cBhvr>
                                     </p:animEffect>
@@ -7867,7 +6799,7 @@
 </p:sld>
 </file>
 
-<file path=ppt/slides/slide6.xml><?xml version="1.0" encoding="utf-8"?>
+<file path=ppt/slides/slide5.xml><?xml version="1.0" encoding="utf-8"?>
 <p:sld xmlns:a="http://schemas.openxmlformats.org/drawingml/2006/main" xmlns:r="http://schemas.openxmlformats.org/officeDocument/2006/relationships" xmlns:p="http://schemas.openxmlformats.org/presentationml/2006/main">
   <p:cSld>
     <p:spTree>
@@ -8003,7 +6935,7 @@
 </p:sld>
 </file>
 
-<file path=ppt/slides/slide7.xml><?xml version="1.0" encoding="utf-8"?>
+<file path=ppt/slides/slide6.xml><?xml version="1.0" encoding="utf-8"?>
 <p:sld xmlns:a="http://schemas.openxmlformats.org/drawingml/2006/main" xmlns:r="http://schemas.openxmlformats.org/officeDocument/2006/relationships" xmlns:p="http://schemas.openxmlformats.org/presentationml/2006/main">
   <p:cSld>
     <p:spTree>
@@ -8139,7 +7071,7 @@
 </p:sld>
 </file>
 
-<file path=ppt/slides/slide8.xml><?xml version="1.0" encoding="utf-8"?>
+<file path=ppt/slides/slide7.xml><?xml version="1.0" encoding="utf-8"?>
 <p:sld xmlns:a="http://schemas.openxmlformats.org/drawingml/2006/main" xmlns:r="http://schemas.openxmlformats.org/officeDocument/2006/relationships" xmlns:p="http://schemas.openxmlformats.org/presentationml/2006/main">
   <p:cSld>
     <p:spTree>
@@ -8268,7 +7200,7 @@
 </p:sld>
 </file>
 
-<file path=ppt/slides/slide9.xml><?xml version="1.0" encoding="utf-8"?>
+<file path=ppt/slides/slide8.xml><?xml version="1.0" encoding="utf-8"?>
 <p:sld xmlns:a="http://schemas.openxmlformats.org/drawingml/2006/main" xmlns:r="http://schemas.openxmlformats.org/officeDocument/2006/relationships" xmlns:p="http://schemas.openxmlformats.org/presentationml/2006/main">
   <p:cSld>
     <p:spTree>
@@ -8383,6 +7315,133 @@
     <p:extLst>
       <p:ext uri="{BB962C8B-B14F-4D97-AF65-F5344CB8AC3E}">
         <p14:creationId xmlns:p14="http://schemas.microsoft.com/office/powerpoint/2010/main" val="2930824741"/>
+      </p:ext>
+    </p:extLst>
+  </p:cSld>
+  <p:clrMapOvr>
+    <a:masterClrMapping/>
+  </p:clrMapOvr>
+  <p:transition spd="slow">
+    <p:push/>
+  </p:transition>
+</p:sld>
+</file>
+
+<file path=ppt/slides/slide9.xml><?xml version="1.0" encoding="utf-8"?>
+<p:sld xmlns:a="http://schemas.openxmlformats.org/drawingml/2006/main" xmlns:r="http://schemas.openxmlformats.org/officeDocument/2006/relationships" xmlns:p="http://schemas.openxmlformats.org/presentationml/2006/main">
+  <p:cSld>
+    <p:spTree>
+      <p:nvGrpSpPr>
+        <p:cNvPr id="1" name=""/>
+        <p:cNvGrpSpPr/>
+        <p:nvPr/>
+      </p:nvGrpSpPr>
+      <p:grpSpPr>
+        <a:xfrm>
+          <a:off x="0" y="0"/>
+          <a:ext cx="0" cy="0"/>
+          <a:chOff x="0" y="0"/>
+          <a:chExt cx="0" cy="0"/>
+        </a:xfrm>
+      </p:grpSpPr>
+      <p:sp>
+        <p:nvSpPr>
+          <p:cNvPr id="3" name="Rectangle 2">
+            <a:extLst>
+              <a:ext uri="{FF2B5EF4-FFF2-40B4-BE49-F238E27FC236}">
+                <a16:creationId xmlns:a16="http://schemas.microsoft.com/office/drawing/2014/main" id="{0CA1A0A2-64BA-26D8-B011-DE0C7E7780AB}"/>
+              </a:ext>
+            </a:extLst>
+          </p:cNvPr>
+          <p:cNvSpPr/>
+          <p:nvPr/>
+        </p:nvSpPr>
+        <p:spPr>
+          <a:xfrm>
+            <a:off x="0" y="0"/>
+            <a:ext cx="12192000" cy="6858000"/>
+          </a:xfrm>
+          <a:prstGeom prst="rect">
+            <a:avLst/>
+          </a:prstGeom>
+          <a:solidFill>
+            <a:srgbClr val="1C62CA"/>
+          </a:solidFill>
+          <a:ln>
+            <a:noFill/>
+          </a:ln>
+        </p:spPr>
+        <p:style>
+          <a:lnRef idx="2">
+            <a:schemeClr val="accent1">
+              <a:shade val="15000"/>
+            </a:schemeClr>
+          </a:lnRef>
+          <a:fillRef idx="1">
+            <a:schemeClr val="accent1"/>
+          </a:fillRef>
+          <a:effectRef idx="0">
+            <a:schemeClr val="accent1"/>
+          </a:effectRef>
+          <a:fontRef idx="minor">
+            <a:schemeClr val="lt1"/>
+          </a:fontRef>
+        </p:style>
+        <p:txBody>
+          <a:bodyPr rtlCol="0" anchor="ctr"/>
+          <a:lstStyle/>
+          <a:p>
+            <a:pPr algn="ctr"/>
+            <a:endParaRPr lang="fr-FR"/>
+          </a:p>
+        </p:txBody>
+      </p:sp>
+      <p:sp>
+        <p:nvSpPr>
+          <p:cNvPr id="2" name="Titre 1">
+            <a:extLst>
+              <a:ext uri="{FF2B5EF4-FFF2-40B4-BE49-F238E27FC236}">
+                <a16:creationId xmlns:a16="http://schemas.microsoft.com/office/drawing/2014/main" id="{3C2ABF41-BFFD-A046-D6CD-B22EFF188F48}"/>
+              </a:ext>
+            </a:extLst>
+          </p:cNvPr>
+          <p:cNvSpPr>
+            <a:spLocks noGrp="1"/>
+          </p:cNvSpPr>
+          <p:nvPr>
+            <p:ph type="title"/>
+          </p:nvPr>
+        </p:nvSpPr>
+        <p:spPr>
+          <a:xfrm>
+            <a:off x="2988128" y="2766218"/>
+            <a:ext cx="6215743" cy="1325563"/>
+          </a:xfrm>
+        </p:spPr>
+        <p:txBody>
+          <a:bodyPr>
+            <a:normAutofit/>
+          </a:bodyPr>
+          <a:lstStyle/>
+          <a:p>
+            <a:pPr algn="ctr"/>
+            <a:r>
+              <a:rPr lang="fr-FR" sz="4800" dirty="0">
+                <a:solidFill>
+                  <a:schemeClr val="bg1"/>
+                </a:solidFill>
+                <a:latin typeface="Kanit SemiBold" pitchFamily="2" charset="-34"/>
+                <a:cs typeface="Kanit SemiBold" pitchFamily="2" charset="-34"/>
+              </a:rPr>
+              <a:t>Bilans individuels</a:t>
+            </a:r>
+          </a:p>
+        </p:txBody>
+      </p:sp>
+    </p:spTree>
+    <p:extLst>
+      <p:ext uri="{BB962C8B-B14F-4D97-AF65-F5344CB8AC3E}">
+        <p14:creationId xmlns:p14="http://schemas.microsoft.com/office/powerpoint/2010/main" val="147937431"/>
       </p:ext>
     </p:extLst>
   </p:cSld>

</xml_diff>